<commit_message>
Simplified Adding Text to a Slide
</commit_message>
<xml_diff>
--- a/VGMC 2022 Spring Slides.pptx
+++ b/VGMC 2022 Spring Slides.pptx
@@ -8,7 +8,7 @@
     <p:sldId id="256" r:id="rId7"/>
     <p:sldId id="257" r:id="rId8"/>
   </p:sldIdLst>
-  <p:sldSz cx="14630400" cy="8229600" type="screen4x3"/>
+  <p:sldSz cx="12191695" cy="6858000" type="screen4x3"/>
   <p:notesSz cx="6858000" cy="9144000"/>
   <p:defaultTextStyle>
     <a:defPPr>
@@ -3104,6 +3104,9 @@
           <a:bodyPr/>
           <a:lstStyle/>
           <a:p>
+            <a:pPr>
+              <a:defRPr sz="5400"/>
+            </a:pPr>
             <a:r>
               <a:t>Video Game Music Guessing Competition</a:t>
             </a:r>
@@ -3125,6 +3128,9 @@
           <a:bodyPr/>
           <a:lstStyle/>
           <a:p>
+            <a:pPr>
+              <a:defRPr sz="1800" b="0" i="0"/>
+            </a:pPr>
             <a:r>
               <a:t>Sponsored by the Computer Science Club</a:t>
             </a:r>
@@ -3164,6 +3170,9 @@
           <a:bodyPr/>
           <a:lstStyle/>
           <a:p>
+            <a:pPr>
+              <a:defRPr sz="5400"/>
+            </a:pPr>
             <a:r>
               <a:t>Rules and Scoring</a:t>
             </a:r>
@@ -3185,39 +3194,57 @@
           <a:bodyPr/>
           <a:lstStyle/>
           <a:p>
+            <a:pPr>
+              <a:defRPr sz="2000" b="0" i="0"/>
+            </a:pPr>
             <a:r>
               <a:t>There will be 5 Rounds of 10 Tracks</a:t>
             </a:r>
           </a:p>
           <a:p>
+            <a:pPr>
+              <a:defRPr sz="2000" b="0" i="0"/>
+            </a:pPr>
             <a:r>
               <a:t>You will get roughly 30 – 45 seconds of music to guess from.</a:t>
             </a:r>
           </a:p>
           <a:p>
+            <a:pPr>
+              <a:defRPr sz="2000" b="0" i="0"/>
+            </a:pPr>
             <a:r>
               <a:t>Scoring is as follows:</a:t>
             </a:r>
           </a:p>
           <a:p>
-            <a:pPr lvl="1"/>
+            <a:pPr lvl="1">
+              <a:defRPr sz="1800" b="0" i="0"/>
+            </a:pPr>
             <a:r>
               <a:t>1 point for Game Franchise</a:t>
             </a:r>
           </a:p>
           <a:p>
-            <a:pPr lvl="1"/>
+            <a:pPr lvl="1">
+              <a:defRPr sz="1800" b="0" i="1"/>
+            </a:pPr>
             <a:r>
               <a:t>1 point for Specific Game</a:t>
             </a:r>
           </a:p>
           <a:p>
-            <a:pPr lvl="1"/>
+            <a:pPr lvl="1">
+              <a:defRPr sz="1800" b="1" i="0"/>
+            </a:pPr>
             <a:r>
               <a:t>1 point for Track Name/Place</a:t>
             </a:r>
           </a:p>
           <a:p>
+            <a:pPr>
+              <a:defRPr sz="2000" b="0" i="0"/>
+            </a:pPr>
             <a:r>
               <a:t>A couple songs don’t have official releases, or play in multiple places. Those have a star listed on the answer key, and if you put something close to it you’ll still receive the point.</a:t>
             </a:r>

</xml_diff>

<commit_message>
Review Slide has the text centered correctly with a unit of 1
</commit_message>
<xml_diff>
--- a/VGMC 2022 Spring Slides.pptx
+++ b/VGMC 2022 Spring Slides.pptx
@@ -1580,7 +1580,7 @@
           <a:p>
             <a:fld id="{CE60F759-2DB9-45EC-93E5-4C9B94ABF359}" type="datetimeFigureOut">
               <a:rPr lang="en-US" smtClean="0"/>
-              <a:t>3/5/2022</a:t>
+              <a:t>3/6/2022</a:t>
             </a:fld>
             <a:endParaRPr lang="en-US"/>
           </a:p>
@@ -3034,7 +3034,7 @@
           <a:p>
             <a:fld id="{CE60F759-2DB9-45EC-93E5-4C9B94ABF359}" type="datetimeFigureOut">
               <a:rPr lang="en-US" smtClean="0"/>
-              <a:t>3/5/2022</a:t>
+              <a:t>3/6/2022</a:t>
             </a:fld>
             <a:endParaRPr lang="en-US"/>
           </a:p>
@@ -4422,7 +4422,7 @@
           <a:p>
             <a:fld id="{CE60F759-2DB9-45EC-93E5-4C9B94ABF359}" type="datetimeFigureOut">
               <a:rPr lang="en-US" smtClean="0"/>
-              <a:t>3/5/2022</a:t>
+              <a:t>3/6/2022</a:t>
             </a:fld>
             <a:endParaRPr lang="en-US"/>
           </a:p>
@@ -5825,7 +5825,7 @@
           <a:p>
             <a:fld id="{CE60F759-2DB9-45EC-93E5-4C9B94ABF359}" type="datetimeFigureOut">
               <a:rPr lang="en-US" smtClean="0"/>
-              <a:t>3/5/2022</a:t>
+              <a:t>3/6/2022</a:t>
             </a:fld>
             <a:endParaRPr lang="en-US"/>
           </a:p>
@@ -5887,7 +5887,7 @@
 </file>
 
 <file path=ppt/slideLayouts/slideLayout5.xml><?xml version="1.0" encoding="utf-8"?>
-<p:sldLayout xmlns:a="http://schemas.openxmlformats.org/drawingml/2006/main" xmlns:r="http://schemas.openxmlformats.org/officeDocument/2006/relationships" xmlns:p="http://schemas.openxmlformats.org/presentationml/2006/main" type="obj" preserve="1">
+<p:sldLayout xmlns:a="http://schemas.openxmlformats.org/drawingml/2006/main" xmlns:r="http://schemas.openxmlformats.org/officeDocument/2006/relationships" xmlns:p="http://schemas.openxmlformats.org/presentationml/2006/main" preserve="1" userDrawn="1">
   <p:cSld name="Review">
     <p:spTree>
       <p:nvGrpSpPr>
@@ -6981,7 +6981,7 @@
           <p:nvSpPr>
             <p:cNvPr id="101" name="Freeform 25"/>
             <p:cNvSpPr/>
-            <p:nvPr/>
+            <p:nvPr userDrawn="1"/>
           </p:nvSpPr>
           <p:spPr bwMode="auto">
             <a:xfrm>
@@ -7199,46 +7199,38 @@
       </p:sp>
       <p:sp>
         <p:nvSpPr>
-          <p:cNvPr id="3" name="Content Placeholder 2"/>
+          <p:cNvPr id="5" name="Content Placeholder 4">
+            <a:extLst>
+              <a:ext uri="{FF2B5EF4-FFF2-40B4-BE49-F238E27FC236}">
+                <a16:creationId xmlns:a16="http://schemas.microsoft.com/office/drawing/2014/main" id="{9C143A25-4028-4D17-B80D-F98572EBAFC3}"/>
+              </a:ext>
+            </a:extLst>
+          </p:cNvPr>
           <p:cNvSpPr>
             <a:spLocks noGrp="1"/>
           </p:cNvSpPr>
           <p:nvPr>
-            <p:ph idx="1" hasCustomPrompt="1"/>
+            <p:ph sz="quarter" idx="10" hasCustomPrompt="1"/>
           </p:nvPr>
         </p:nvSpPr>
         <p:spPr>
           <a:xfrm>
-            <a:off x="1747538" y="722349"/>
+            <a:off x="1751646" y="722349"/>
             <a:ext cx="2834640" cy="914400"/>
           </a:xfrm>
         </p:spPr>
         <p:txBody>
-          <a:bodyPr anchor="ctr">
-            <a:normAutofit/>
-          </a:bodyPr>
+          <a:bodyPr/>
           <a:lstStyle>
             <a:lvl1pPr>
               <a:defRPr sz="4400"/>
             </a:lvl1pPr>
-            <a:lvl2pPr>
-              <a:defRPr sz="2200"/>
-            </a:lvl2pPr>
-            <a:lvl3pPr>
-              <a:defRPr sz="2000"/>
-            </a:lvl3pPr>
-            <a:lvl4pPr>
-              <a:defRPr sz="1800"/>
-            </a:lvl4pPr>
-            <a:lvl5pPr>
-              <a:defRPr sz="1800"/>
-            </a:lvl5pPr>
           </a:lstStyle>
           <a:p>
             <a:pPr lvl="0"/>
             <a:r>
               <a:rPr lang="en-US" dirty="0"/>
-              <a:t>Track #</a:t>
+              <a:t> Track #</a:t>
             </a:r>
           </a:p>
         </p:txBody>
@@ -8638,7 +8630,7 @@
           <a:p>
             <a:fld id="{CE60F759-2DB9-45EC-93E5-4C9B94ABF359}" type="datetimeFigureOut">
               <a:rPr lang="en-US" smtClean="0"/>
-              <a:t>3/5/2022</a:t>
+              <a:t>3/6/2022</a:t>
             </a:fld>
             <a:endParaRPr lang="en-US"/>
           </a:p>
@@ -8867,7 +8859,7 @@
           <a:p>
             <a:fld id="{CE60F759-2DB9-45EC-93E5-4C9B94ABF359}" type="datetimeFigureOut">
               <a:rPr lang="en-US" smtClean="0"/>
-              <a:t>3/5/2022</a:t>
+              <a:t>3/6/2022</a:t>
             </a:fld>
             <a:endParaRPr lang="en-US"/>
           </a:p>
@@ -9808,29 +9800,12 @@
             <a:spLocks noGrp="1"/>
           </p:cNvSpPr>
           <p:nvPr>
-            <p:ph idx="1"/>
-          </p:nvPr>
-        </p:nvSpPr>
-        <p:spPr/>
-        <p:txBody>
-          <a:bodyPr/>
-          <a:lstStyle/>
-          <a:p/>
-        </p:txBody>
-      </p:sp>
-      <p:sp>
-        <p:nvSpPr>
-          <p:cNvPr id="3" name="Content Placeholder 2"/>
-          <p:cNvSpPr>
-            <a:spLocks noGrp="1"/>
-          </p:cNvSpPr>
-          <p:nvPr>
-            <p:ph idx="1"/>
+            <p:ph idx="10" sz="quarter"/>
           </p:nvPr>
         </p:nvSpPr>
         <p:spPr>
           <a:xfrm>
-            <a:off x="6912864" y="3730752"/>
+            <a:off x="6912864" y="1828800"/>
             <a:ext cx="2834640" cy="914400"/>
           </a:xfrm>
         </p:spPr>
@@ -9851,12 +9826,12 @@
             <a:spLocks noGrp="1"/>
           </p:cNvSpPr>
           <p:nvPr>
-            <p:ph idx="1"/>
+            <p:ph idx="10" sz="quarter"/>
           </p:nvPr>
         </p:nvSpPr>
         <p:spPr>
           <a:xfrm>
-            <a:off x="11018520" y="3730752"/>
+            <a:off x="11018520" y="1828800"/>
             <a:ext cx="2834640" cy="914400"/>
           </a:xfrm>
         </p:spPr>
@@ -9877,12 +9852,12 @@
             <a:spLocks noGrp="1"/>
           </p:cNvSpPr>
           <p:nvPr>
-            <p:ph idx="1"/>
+            <p:ph idx="10" sz="quarter"/>
           </p:nvPr>
         </p:nvSpPr>
         <p:spPr>
           <a:xfrm>
-            <a:off x="6912864" y="4727448"/>
+            <a:off x="6912864" y="2743200"/>
             <a:ext cx="2834640" cy="914400"/>
           </a:xfrm>
         </p:spPr>
@@ -9903,12 +9878,12 @@
             <a:spLocks noGrp="1"/>
           </p:cNvSpPr>
           <p:nvPr>
-            <p:ph idx="1"/>
+            <p:ph idx="10" sz="quarter"/>
           </p:nvPr>
         </p:nvSpPr>
         <p:spPr>
           <a:xfrm>
-            <a:off x="11018520" y="4727448"/>
+            <a:off x="11018520" y="2743200"/>
             <a:ext cx="2834640" cy="914400"/>
           </a:xfrm>
         </p:spPr>
@@ -9929,12 +9904,12 @@
             <a:spLocks noGrp="1"/>
           </p:cNvSpPr>
           <p:nvPr>
-            <p:ph idx="1"/>
+            <p:ph idx="10" sz="quarter"/>
           </p:nvPr>
         </p:nvSpPr>
         <p:spPr>
           <a:xfrm>
-            <a:off x="6912864" y="5724144"/>
+            <a:off x="6912864" y="3657600"/>
             <a:ext cx="2834640" cy="914400"/>
           </a:xfrm>
         </p:spPr>
@@ -9955,12 +9930,12 @@
             <a:spLocks noGrp="1"/>
           </p:cNvSpPr>
           <p:nvPr>
-            <p:ph idx="1"/>
+            <p:ph idx="10" sz="quarter"/>
           </p:nvPr>
         </p:nvSpPr>
         <p:spPr>
           <a:xfrm>
-            <a:off x="11018520" y="5724144"/>
+            <a:off x="11018520" y="3657600"/>
             <a:ext cx="2834640" cy="914400"/>
           </a:xfrm>
         </p:spPr>
@@ -9981,12 +9956,12 @@
             <a:spLocks noGrp="1"/>
           </p:cNvSpPr>
           <p:nvPr>
-            <p:ph idx="1"/>
+            <p:ph idx="10" sz="quarter"/>
           </p:nvPr>
         </p:nvSpPr>
         <p:spPr>
           <a:xfrm>
-            <a:off x="6912864" y="6720840"/>
+            <a:off x="6912864" y="4572000"/>
             <a:ext cx="2834640" cy="914400"/>
           </a:xfrm>
         </p:spPr>
@@ -10007,12 +9982,12 @@
             <a:spLocks noGrp="1"/>
           </p:cNvSpPr>
           <p:nvPr>
-            <p:ph idx="1"/>
+            <p:ph idx="10" sz="quarter"/>
           </p:nvPr>
         </p:nvSpPr>
         <p:spPr>
           <a:xfrm>
-            <a:off x="11018520" y="6720840"/>
+            <a:off x="11018520" y="4572000"/>
             <a:ext cx="2834640" cy="914400"/>
           </a:xfrm>
         </p:spPr>
@@ -10033,12 +10008,12 @@
             <a:spLocks noGrp="1"/>
           </p:cNvSpPr>
           <p:nvPr>
-            <p:ph idx="1"/>
+            <p:ph idx="10" sz="quarter"/>
           </p:nvPr>
         </p:nvSpPr>
         <p:spPr>
           <a:xfrm>
-            <a:off x="6912864" y="7717536"/>
+            <a:off x="6912864" y="5486400"/>
             <a:ext cx="2834640" cy="914400"/>
           </a:xfrm>
         </p:spPr>
@@ -10059,12 +10034,12 @@
             <a:spLocks noGrp="1"/>
           </p:cNvSpPr>
           <p:nvPr>
-            <p:ph idx="1"/>
+            <p:ph idx="10" sz="quarter"/>
           </p:nvPr>
         </p:nvSpPr>
         <p:spPr>
           <a:xfrm>
-            <a:off x="11018520" y="7717536"/>
+            <a:off x="11018520" y="5486400"/>
             <a:ext cx="2834640" cy="914400"/>
           </a:xfrm>
         </p:spPr>
@@ -11214,29 +11189,12 @@
             <a:spLocks noGrp="1"/>
           </p:cNvSpPr>
           <p:nvPr>
-            <p:ph idx="1"/>
-          </p:nvPr>
-        </p:nvSpPr>
-        <p:spPr/>
-        <p:txBody>
-          <a:bodyPr/>
-          <a:lstStyle/>
-          <a:p/>
-        </p:txBody>
-      </p:sp>
-      <p:sp>
-        <p:nvSpPr>
-          <p:cNvPr id="3" name="Content Placeholder 2"/>
-          <p:cNvSpPr>
-            <a:spLocks noGrp="1"/>
-          </p:cNvSpPr>
-          <p:nvPr>
-            <p:ph idx="1"/>
+            <p:ph idx="10" sz="quarter"/>
           </p:nvPr>
         </p:nvSpPr>
         <p:spPr>
           <a:xfrm>
-            <a:off x="6912864" y="3730752"/>
+            <a:off x="6912864" y="1828800"/>
             <a:ext cx="2834640" cy="914400"/>
           </a:xfrm>
         </p:spPr>
@@ -11257,12 +11215,12 @@
             <a:spLocks noGrp="1"/>
           </p:cNvSpPr>
           <p:nvPr>
-            <p:ph idx="1"/>
+            <p:ph idx="10" sz="quarter"/>
           </p:nvPr>
         </p:nvSpPr>
         <p:spPr>
           <a:xfrm>
-            <a:off x="11018520" y="3730752"/>
+            <a:off x="11018520" y="1828800"/>
             <a:ext cx="2834640" cy="914400"/>
           </a:xfrm>
         </p:spPr>
@@ -11283,12 +11241,12 @@
             <a:spLocks noGrp="1"/>
           </p:cNvSpPr>
           <p:nvPr>
-            <p:ph idx="1"/>
+            <p:ph idx="10" sz="quarter"/>
           </p:nvPr>
         </p:nvSpPr>
         <p:spPr>
           <a:xfrm>
-            <a:off x="6912864" y="4727448"/>
+            <a:off x="6912864" y="2743200"/>
             <a:ext cx="2834640" cy="914400"/>
           </a:xfrm>
         </p:spPr>
@@ -11309,12 +11267,12 @@
             <a:spLocks noGrp="1"/>
           </p:cNvSpPr>
           <p:nvPr>
-            <p:ph idx="1"/>
+            <p:ph idx="10" sz="quarter"/>
           </p:nvPr>
         </p:nvSpPr>
         <p:spPr>
           <a:xfrm>
-            <a:off x="11018520" y="4727448"/>
+            <a:off x="11018520" y="2743200"/>
             <a:ext cx="2834640" cy="914400"/>
           </a:xfrm>
         </p:spPr>
@@ -11335,12 +11293,12 @@
             <a:spLocks noGrp="1"/>
           </p:cNvSpPr>
           <p:nvPr>
-            <p:ph idx="1"/>
+            <p:ph idx="10" sz="quarter"/>
           </p:nvPr>
         </p:nvSpPr>
         <p:spPr>
           <a:xfrm>
-            <a:off x="6912864" y="5724144"/>
+            <a:off x="6912864" y="3657600"/>
             <a:ext cx="2834640" cy="914400"/>
           </a:xfrm>
         </p:spPr>
@@ -11361,12 +11319,12 @@
             <a:spLocks noGrp="1"/>
           </p:cNvSpPr>
           <p:nvPr>
-            <p:ph idx="1"/>
+            <p:ph idx="10" sz="quarter"/>
           </p:nvPr>
         </p:nvSpPr>
         <p:spPr>
           <a:xfrm>
-            <a:off x="11018520" y="5724144"/>
+            <a:off x="11018520" y="3657600"/>
             <a:ext cx="2834640" cy="914400"/>
           </a:xfrm>
         </p:spPr>
@@ -11387,12 +11345,12 @@
             <a:spLocks noGrp="1"/>
           </p:cNvSpPr>
           <p:nvPr>
-            <p:ph idx="1"/>
+            <p:ph idx="10" sz="quarter"/>
           </p:nvPr>
         </p:nvSpPr>
         <p:spPr>
           <a:xfrm>
-            <a:off x="6912864" y="6720840"/>
+            <a:off x="6912864" y="4572000"/>
             <a:ext cx="2834640" cy="914400"/>
           </a:xfrm>
         </p:spPr>
@@ -11413,12 +11371,12 @@
             <a:spLocks noGrp="1"/>
           </p:cNvSpPr>
           <p:nvPr>
-            <p:ph idx="1"/>
+            <p:ph idx="10" sz="quarter"/>
           </p:nvPr>
         </p:nvSpPr>
         <p:spPr>
           <a:xfrm>
-            <a:off x="11018520" y="6720840"/>
+            <a:off x="11018520" y="4572000"/>
             <a:ext cx="2834640" cy="914400"/>
           </a:xfrm>
         </p:spPr>
@@ -11439,12 +11397,12 @@
             <a:spLocks noGrp="1"/>
           </p:cNvSpPr>
           <p:nvPr>
-            <p:ph idx="1"/>
+            <p:ph idx="10" sz="quarter"/>
           </p:nvPr>
         </p:nvSpPr>
         <p:spPr>
           <a:xfrm>
-            <a:off x="6912864" y="7717536"/>
+            <a:off x="6912864" y="5486400"/>
             <a:ext cx="2834640" cy="914400"/>
           </a:xfrm>
         </p:spPr>
@@ -11465,12 +11423,12 @@
             <a:spLocks noGrp="1"/>
           </p:cNvSpPr>
           <p:nvPr>
-            <p:ph idx="1"/>
+            <p:ph idx="10" sz="quarter"/>
           </p:nvPr>
         </p:nvSpPr>
         <p:spPr>
           <a:xfrm>
-            <a:off x="11018520" y="7717536"/>
+            <a:off x="11018520" y="5486400"/>
             <a:ext cx="2834640" cy="914400"/>
           </a:xfrm>
         </p:spPr>
@@ -12548,29 +12506,12 @@
             <a:spLocks noGrp="1"/>
           </p:cNvSpPr>
           <p:nvPr>
-            <p:ph idx="1"/>
-          </p:nvPr>
-        </p:nvSpPr>
-        <p:spPr/>
-        <p:txBody>
-          <a:bodyPr/>
-          <a:lstStyle/>
-          <a:p/>
-        </p:txBody>
-      </p:sp>
-      <p:sp>
-        <p:nvSpPr>
-          <p:cNvPr id="3" name="Content Placeholder 2"/>
-          <p:cNvSpPr>
-            <a:spLocks noGrp="1"/>
-          </p:cNvSpPr>
-          <p:nvPr>
-            <p:ph idx="1"/>
+            <p:ph idx="10" sz="quarter"/>
           </p:nvPr>
         </p:nvSpPr>
         <p:spPr>
           <a:xfrm>
-            <a:off x="6912864" y="3730752"/>
+            <a:off x="6912864" y="1828800"/>
             <a:ext cx="2834640" cy="914400"/>
           </a:xfrm>
         </p:spPr>
@@ -12591,12 +12532,12 @@
             <a:spLocks noGrp="1"/>
           </p:cNvSpPr>
           <p:nvPr>
-            <p:ph idx="1"/>
+            <p:ph idx="10" sz="quarter"/>
           </p:nvPr>
         </p:nvSpPr>
         <p:spPr>
           <a:xfrm>
-            <a:off x="11018520" y="3730752"/>
+            <a:off x="11018520" y="1828800"/>
             <a:ext cx="2834640" cy="914400"/>
           </a:xfrm>
         </p:spPr>
@@ -12617,12 +12558,12 @@
             <a:spLocks noGrp="1"/>
           </p:cNvSpPr>
           <p:nvPr>
-            <p:ph idx="1"/>
+            <p:ph idx="10" sz="quarter"/>
           </p:nvPr>
         </p:nvSpPr>
         <p:spPr>
           <a:xfrm>
-            <a:off x="6912864" y="4727448"/>
+            <a:off x="6912864" y="2743200"/>
             <a:ext cx="2834640" cy="914400"/>
           </a:xfrm>
         </p:spPr>
@@ -12643,12 +12584,12 @@
             <a:spLocks noGrp="1"/>
           </p:cNvSpPr>
           <p:nvPr>
-            <p:ph idx="1"/>
+            <p:ph idx="10" sz="quarter"/>
           </p:nvPr>
         </p:nvSpPr>
         <p:spPr>
           <a:xfrm>
-            <a:off x="11018520" y="4727448"/>
+            <a:off x="11018520" y="2743200"/>
             <a:ext cx="2834640" cy="914400"/>
           </a:xfrm>
         </p:spPr>
@@ -12669,12 +12610,12 @@
             <a:spLocks noGrp="1"/>
           </p:cNvSpPr>
           <p:nvPr>
-            <p:ph idx="1"/>
+            <p:ph idx="10" sz="quarter"/>
           </p:nvPr>
         </p:nvSpPr>
         <p:spPr>
           <a:xfrm>
-            <a:off x="6912864" y="5724144"/>
+            <a:off x="6912864" y="3657600"/>
             <a:ext cx="2834640" cy="914400"/>
           </a:xfrm>
         </p:spPr>
@@ -12695,12 +12636,12 @@
             <a:spLocks noGrp="1"/>
           </p:cNvSpPr>
           <p:nvPr>
-            <p:ph idx="1"/>
+            <p:ph idx="10" sz="quarter"/>
           </p:nvPr>
         </p:nvSpPr>
         <p:spPr>
           <a:xfrm>
-            <a:off x="11018520" y="5724144"/>
+            <a:off x="11018520" y="3657600"/>
             <a:ext cx="2834640" cy="914400"/>
           </a:xfrm>
         </p:spPr>
@@ -12721,12 +12662,12 @@
             <a:spLocks noGrp="1"/>
           </p:cNvSpPr>
           <p:nvPr>
-            <p:ph idx="1"/>
+            <p:ph idx="10" sz="quarter"/>
           </p:nvPr>
         </p:nvSpPr>
         <p:spPr>
           <a:xfrm>
-            <a:off x="6912864" y="6720840"/>
+            <a:off x="6912864" y="4572000"/>
             <a:ext cx="2834640" cy="914400"/>
           </a:xfrm>
         </p:spPr>
@@ -12747,12 +12688,12 @@
             <a:spLocks noGrp="1"/>
           </p:cNvSpPr>
           <p:nvPr>
-            <p:ph idx="1"/>
+            <p:ph idx="10" sz="quarter"/>
           </p:nvPr>
         </p:nvSpPr>
         <p:spPr>
           <a:xfrm>
-            <a:off x="11018520" y="6720840"/>
+            <a:off x="11018520" y="4572000"/>
             <a:ext cx="2834640" cy="914400"/>
           </a:xfrm>
         </p:spPr>
@@ -12773,12 +12714,12 @@
             <a:spLocks noGrp="1"/>
           </p:cNvSpPr>
           <p:nvPr>
-            <p:ph idx="1"/>
+            <p:ph idx="10" sz="quarter"/>
           </p:nvPr>
         </p:nvSpPr>
         <p:spPr>
           <a:xfrm>
-            <a:off x="6912864" y="7717536"/>
+            <a:off x="6912864" y="5486400"/>
             <a:ext cx="2834640" cy="914400"/>
           </a:xfrm>
         </p:spPr>
@@ -12799,12 +12740,12 @@
             <a:spLocks noGrp="1"/>
           </p:cNvSpPr>
           <p:nvPr>
-            <p:ph idx="1"/>
+            <p:ph idx="10" sz="quarter"/>
           </p:nvPr>
         </p:nvSpPr>
         <p:spPr>
           <a:xfrm>
-            <a:off x="11018520" y="7717536"/>
+            <a:off x="11018520" y="5486400"/>
             <a:ext cx="2834640" cy="914400"/>
           </a:xfrm>
         </p:spPr>
@@ -14031,29 +13972,12 @@
             <a:spLocks noGrp="1"/>
           </p:cNvSpPr>
           <p:nvPr>
-            <p:ph idx="1"/>
-          </p:nvPr>
-        </p:nvSpPr>
-        <p:spPr/>
-        <p:txBody>
-          <a:bodyPr/>
-          <a:lstStyle/>
-          <a:p/>
-        </p:txBody>
-      </p:sp>
-      <p:sp>
-        <p:nvSpPr>
-          <p:cNvPr id="3" name="Content Placeholder 2"/>
-          <p:cNvSpPr>
-            <a:spLocks noGrp="1"/>
-          </p:cNvSpPr>
-          <p:nvPr>
-            <p:ph idx="1"/>
+            <p:ph idx="10" sz="quarter"/>
           </p:nvPr>
         </p:nvSpPr>
         <p:spPr>
           <a:xfrm>
-            <a:off x="6912864" y="3730752"/>
+            <a:off x="6912864" y="1828800"/>
             <a:ext cx="2834640" cy="914400"/>
           </a:xfrm>
         </p:spPr>
@@ -14074,12 +13998,12 @@
             <a:spLocks noGrp="1"/>
           </p:cNvSpPr>
           <p:nvPr>
-            <p:ph idx="1"/>
+            <p:ph idx="10" sz="quarter"/>
           </p:nvPr>
         </p:nvSpPr>
         <p:spPr>
           <a:xfrm>
-            <a:off x="11018520" y="3730752"/>
+            <a:off x="11018520" y="1828800"/>
             <a:ext cx="2834640" cy="914400"/>
           </a:xfrm>
         </p:spPr>
@@ -14100,12 +14024,12 @@
             <a:spLocks noGrp="1"/>
           </p:cNvSpPr>
           <p:nvPr>
-            <p:ph idx="1"/>
+            <p:ph idx="10" sz="quarter"/>
           </p:nvPr>
         </p:nvSpPr>
         <p:spPr>
           <a:xfrm>
-            <a:off x="6912864" y="4727448"/>
+            <a:off x="6912864" y="2743200"/>
             <a:ext cx="2834640" cy="914400"/>
           </a:xfrm>
         </p:spPr>
@@ -14126,12 +14050,12 @@
             <a:spLocks noGrp="1"/>
           </p:cNvSpPr>
           <p:nvPr>
-            <p:ph idx="1"/>
+            <p:ph idx="10" sz="quarter"/>
           </p:nvPr>
         </p:nvSpPr>
         <p:spPr>
           <a:xfrm>
-            <a:off x="11018520" y="4727448"/>
+            <a:off x="11018520" y="2743200"/>
             <a:ext cx="2834640" cy="914400"/>
           </a:xfrm>
         </p:spPr>
@@ -14152,12 +14076,12 @@
             <a:spLocks noGrp="1"/>
           </p:cNvSpPr>
           <p:nvPr>
-            <p:ph idx="1"/>
+            <p:ph idx="10" sz="quarter"/>
           </p:nvPr>
         </p:nvSpPr>
         <p:spPr>
           <a:xfrm>
-            <a:off x="6912864" y="5724144"/>
+            <a:off x="6912864" y="3657600"/>
             <a:ext cx="2834640" cy="914400"/>
           </a:xfrm>
         </p:spPr>
@@ -14178,12 +14102,12 @@
             <a:spLocks noGrp="1"/>
           </p:cNvSpPr>
           <p:nvPr>
-            <p:ph idx="1"/>
+            <p:ph idx="10" sz="quarter"/>
           </p:nvPr>
         </p:nvSpPr>
         <p:spPr>
           <a:xfrm>
-            <a:off x="11018520" y="5724144"/>
+            <a:off x="11018520" y="3657600"/>
             <a:ext cx="2834640" cy="914400"/>
           </a:xfrm>
         </p:spPr>
@@ -14204,12 +14128,12 @@
             <a:spLocks noGrp="1"/>
           </p:cNvSpPr>
           <p:nvPr>
-            <p:ph idx="1"/>
+            <p:ph idx="10" sz="quarter"/>
           </p:nvPr>
         </p:nvSpPr>
         <p:spPr>
           <a:xfrm>
-            <a:off x="6912864" y="6720840"/>
+            <a:off x="6912864" y="4572000"/>
             <a:ext cx="2834640" cy="914400"/>
           </a:xfrm>
         </p:spPr>
@@ -14230,12 +14154,12 @@
             <a:spLocks noGrp="1"/>
           </p:cNvSpPr>
           <p:nvPr>
-            <p:ph idx="1"/>
+            <p:ph idx="10" sz="quarter"/>
           </p:nvPr>
         </p:nvSpPr>
         <p:spPr>
           <a:xfrm>
-            <a:off x="11018520" y="6720840"/>
+            <a:off x="11018520" y="4572000"/>
             <a:ext cx="2834640" cy="914400"/>
           </a:xfrm>
         </p:spPr>
@@ -14256,12 +14180,12 @@
             <a:spLocks noGrp="1"/>
           </p:cNvSpPr>
           <p:nvPr>
-            <p:ph idx="1"/>
+            <p:ph idx="10" sz="quarter"/>
           </p:nvPr>
         </p:nvSpPr>
         <p:spPr>
           <a:xfrm>
-            <a:off x="6912864" y="7717536"/>
+            <a:off x="6912864" y="5486400"/>
             <a:ext cx="2834640" cy="914400"/>
           </a:xfrm>
         </p:spPr>
@@ -14282,12 +14206,12 @@
             <a:spLocks noGrp="1"/>
           </p:cNvSpPr>
           <p:nvPr>
-            <p:ph idx="1"/>
+            <p:ph idx="10" sz="quarter"/>
           </p:nvPr>
         </p:nvSpPr>
         <p:spPr>
           <a:xfrm>
-            <a:off x="11018520" y="7717536"/>
+            <a:off x="11018520" y="5486400"/>
             <a:ext cx="2834640" cy="914400"/>
           </a:xfrm>
         </p:spPr>
@@ -15420,29 +15344,12 @@
             <a:spLocks noGrp="1"/>
           </p:cNvSpPr>
           <p:nvPr>
-            <p:ph idx="1"/>
-          </p:nvPr>
-        </p:nvSpPr>
-        <p:spPr/>
-        <p:txBody>
-          <a:bodyPr/>
-          <a:lstStyle/>
-          <a:p/>
-        </p:txBody>
-      </p:sp>
-      <p:sp>
-        <p:nvSpPr>
-          <p:cNvPr id="3" name="Content Placeholder 2"/>
-          <p:cNvSpPr>
-            <a:spLocks noGrp="1"/>
-          </p:cNvSpPr>
-          <p:nvPr>
-            <p:ph idx="1"/>
+            <p:ph idx="10" sz="quarter"/>
           </p:nvPr>
         </p:nvSpPr>
         <p:spPr>
           <a:xfrm>
-            <a:off x="6912864" y="3730752"/>
+            <a:off x="6912864" y="1828800"/>
             <a:ext cx="2834640" cy="914400"/>
           </a:xfrm>
         </p:spPr>
@@ -15463,12 +15370,12 @@
             <a:spLocks noGrp="1"/>
           </p:cNvSpPr>
           <p:nvPr>
-            <p:ph idx="1"/>
+            <p:ph idx="10" sz="quarter"/>
           </p:nvPr>
         </p:nvSpPr>
         <p:spPr>
           <a:xfrm>
-            <a:off x="11018520" y="3730752"/>
+            <a:off x="11018520" y="1828800"/>
             <a:ext cx="2834640" cy="914400"/>
           </a:xfrm>
         </p:spPr>
@@ -15489,12 +15396,12 @@
             <a:spLocks noGrp="1"/>
           </p:cNvSpPr>
           <p:nvPr>
-            <p:ph idx="1"/>
+            <p:ph idx="10" sz="quarter"/>
           </p:nvPr>
         </p:nvSpPr>
         <p:spPr>
           <a:xfrm>
-            <a:off x="6912864" y="4727448"/>
+            <a:off x="6912864" y="2743200"/>
             <a:ext cx="2834640" cy="914400"/>
           </a:xfrm>
         </p:spPr>
@@ -15515,12 +15422,12 @@
             <a:spLocks noGrp="1"/>
           </p:cNvSpPr>
           <p:nvPr>
-            <p:ph idx="1"/>
+            <p:ph idx="10" sz="quarter"/>
           </p:nvPr>
         </p:nvSpPr>
         <p:spPr>
           <a:xfrm>
-            <a:off x="11018520" y="4727448"/>
+            <a:off x="11018520" y="2743200"/>
             <a:ext cx="2834640" cy="914400"/>
           </a:xfrm>
         </p:spPr>
@@ -15541,12 +15448,12 @@
             <a:spLocks noGrp="1"/>
           </p:cNvSpPr>
           <p:nvPr>
-            <p:ph idx="1"/>
+            <p:ph idx="10" sz="quarter"/>
           </p:nvPr>
         </p:nvSpPr>
         <p:spPr>
           <a:xfrm>
-            <a:off x="6912864" y="5724144"/>
+            <a:off x="6912864" y="3657600"/>
             <a:ext cx="2834640" cy="914400"/>
           </a:xfrm>
         </p:spPr>
@@ -15567,12 +15474,12 @@
             <a:spLocks noGrp="1"/>
           </p:cNvSpPr>
           <p:nvPr>
-            <p:ph idx="1"/>
+            <p:ph idx="10" sz="quarter"/>
           </p:nvPr>
         </p:nvSpPr>
         <p:spPr>
           <a:xfrm>
-            <a:off x="11018520" y="5724144"/>
+            <a:off x="11018520" y="3657600"/>
             <a:ext cx="2834640" cy="914400"/>
           </a:xfrm>
         </p:spPr>
@@ -15593,12 +15500,12 @@
             <a:spLocks noGrp="1"/>
           </p:cNvSpPr>
           <p:nvPr>
-            <p:ph idx="1"/>
+            <p:ph idx="10" sz="quarter"/>
           </p:nvPr>
         </p:nvSpPr>
         <p:spPr>
           <a:xfrm>
-            <a:off x="6912864" y="6720840"/>
+            <a:off x="6912864" y="4572000"/>
             <a:ext cx="2834640" cy="914400"/>
           </a:xfrm>
         </p:spPr>
@@ -15619,12 +15526,12 @@
             <a:spLocks noGrp="1"/>
           </p:cNvSpPr>
           <p:nvPr>
-            <p:ph idx="1"/>
+            <p:ph idx="10" sz="quarter"/>
           </p:nvPr>
         </p:nvSpPr>
         <p:spPr>
           <a:xfrm>
-            <a:off x="11018520" y="6720840"/>
+            <a:off x="11018520" y="4572000"/>
             <a:ext cx="2834640" cy="914400"/>
           </a:xfrm>
         </p:spPr>
@@ -15645,12 +15552,12 @@
             <a:spLocks noGrp="1"/>
           </p:cNvSpPr>
           <p:nvPr>
-            <p:ph idx="1"/>
+            <p:ph idx="10" sz="quarter"/>
           </p:nvPr>
         </p:nvSpPr>
         <p:spPr>
           <a:xfrm>
-            <a:off x="6912864" y="7717536"/>
+            <a:off x="6912864" y="5486400"/>
             <a:ext cx="2834640" cy="914400"/>
           </a:xfrm>
         </p:spPr>
@@ -15671,12 +15578,12 @@
             <a:spLocks noGrp="1"/>
           </p:cNvSpPr>
           <p:nvPr>
-            <p:ph idx="1"/>
+            <p:ph idx="10" sz="quarter"/>
           </p:nvPr>
         </p:nvSpPr>
         <p:spPr>
           <a:xfrm>
-            <a:off x="11018520" y="7717536"/>
+            <a:off x="11018520" y="5486400"/>
             <a:ext cx="2834640" cy="914400"/>
           </a:xfrm>
         </p:spPr>

</xml_diff>